<commit_message>
Corrected small math typos
</commit_message>
<xml_diff>
--- a/slides/3_StreamingAnalytics.pptx
+++ b/slides/3_StreamingAnalytics.pptx
@@ -245,7 +245,7 @@
           <a:p>
             <a:fld id="{2F3ABF1A-8818-4472-8518-E71DC7B5D2F7}" type="datetimeFigureOut">
               <a:rPr lang="en-US" smtClean="0"/>
-              <a:t>6/27/2023</a:t>
+              <a:t>2/4/2024</a:t>
             </a:fld>
             <a:endParaRPr lang="en-US"/>
           </a:p>
@@ -827,7 +827,7 @@
           <a:p>
             <a:fld id="{6E4A31BF-7266-4BEB-918B-ADC21C630A6F}" type="datetimeFigureOut">
               <a:rPr lang="en-US" smtClean="0"/>
-              <a:t>6/27/2023</a:t>
+              <a:t>2/4/2024</a:t>
             </a:fld>
             <a:endParaRPr lang="en-US"/>
           </a:p>
@@ -1025,7 +1025,7 @@
           <a:p>
             <a:fld id="{6E4A31BF-7266-4BEB-918B-ADC21C630A6F}" type="datetimeFigureOut">
               <a:rPr lang="en-US" smtClean="0"/>
-              <a:t>6/27/2023</a:t>
+              <a:t>2/4/2024</a:t>
             </a:fld>
             <a:endParaRPr lang="en-US"/>
           </a:p>
@@ -1233,7 +1233,7 @@
           <a:p>
             <a:fld id="{6E4A31BF-7266-4BEB-918B-ADC21C630A6F}" type="datetimeFigureOut">
               <a:rPr lang="en-US" smtClean="0"/>
-              <a:t>6/27/2023</a:t>
+              <a:t>2/4/2024</a:t>
             </a:fld>
             <a:endParaRPr lang="en-US"/>
           </a:p>
@@ -1431,7 +1431,7 @@
           <a:p>
             <a:fld id="{6E4A31BF-7266-4BEB-918B-ADC21C630A6F}" type="datetimeFigureOut">
               <a:rPr lang="en-US" smtClean="0"/>
-              <a:t>6/27/2023</a:t>
+              <a:t>2/4/2024</a:t>
             </a:fld>
             <a:endParaRPr lang="en-US"/>
           </a:p>
@@ -1706,7 +1706,7 @@
           <a:p>
             <a:fld id="{6E4A31BF-7266-4BEB-918B-ADC21C630A6F}" type="datetimeFigureOut">
               <a:rPr lang="en-US" smtClean="0"/>
-              <a:t>6/27/2023</a:t>
+              <a:t>2/4/2024</a:t>
             </a:fld>
             <a:endParaRPr lang="en-US"/>
           </a:p>
@@ -1971,7 +1971,7 @@
           <a:p>
             <a:fld id="{6E4A31BF-7266-4BEB-918B-ADC21C630A6F}" type="datetimeFigureOut">
               <a:rPr lang="en-US" smtClean="0"/>
-              <a:t>6/27/2023</a:t>
+              <a:t>2/4/2024</a:t>
             </a:fld>
             <a:endParaRPr lang="en-US"/>
           </a:p>
@@ -2383,7 +2383,7 @@
           <a:p>
             <a:fld id="{6E4A31BF-7266-4BEB-918B-ADC21C630A6F}" type="datetimeFigureOut">
               <a:rPr lang="en-US" smtClean="0"/>
-              <a:t>6/27/2023</a:t>
+              <a:t>2/4/2024</a:t>
             </a:fld>
             <a:endParaRPr lang="en-US"/>
           </a:p>
@@ -2524,7 +2524,7 @@
           <a:p>
             <a:fld id="{6E4A31BF-7266-4BEB-918B-ADC21C630A6F}" type="datetimeFigureOut">
               <a:rPr lang="en-US" smtClean="0"/>
-              <a:t>6/27/2023</a:t>
+              <a:t>2/4/2024</a:t>
             </a:fld>
             <a:endParaRPr lang="en-US"/>
           </a:p>
@@ -2637,7 +2637,7 @@
           <a:p>
             <a:fld id="{6E4A31BF-7266-4BEB-918B-ADC21C630A6F}" type="datetimeFigureOut">
               <a:rPr lang="en-US" smtClean="0"/>
-              <a:t>6/27/2023</a:t>
+              <a:t>2/4/2024</a:t>
             </a:fld>
             <a:endParaRPr lang="en-US"/>
           </a:p>
@@ -2948,7 +2948,7 @@
           <a:p>
             <a:fld id="{6E4A31BF-7266-4BEB-918B-ADC21C630A6F}" type="datetimeFigureOut">
               <a:rPr lang="en-US" smtClean="0"/>
-              <a:t>6/27/2023</a:t>
+              <a:t>2/4/2024</a:t>
             </a:fld>
             <a:endParaRPr lang="en-US"/>
           </a:p>
@@ -3236,7 +3236,7 @@
           <a:p>
             <a:fld id="{6E4A31BF-7266-4BEB-918B-ADC21C630A6F}" type="datetimeFigureOut">
               <a:rPr lang="en-US" smtClean="0"/>
-              <a:t>6/27/2023</a:t>
+              <a:t>2/4/2024</a:t>
             </a:fld>
             <a:endParaRPr lang="en-US"/>
           </a:p>
@@ -3477,7 +3477,7 @@
           <a:p>
             <a:fld id="{6E4A31BF-7266-4BEB-918B-ADC21C630A6F}" type="datetimeFigureOut">
               <a:rPr lang="en-US" smtClean="0"/>
-              <a:t>6/27/2023</a:t>
+              <a:t>2/4/2024</a:t>
             </a:fld>
             <a:endParaRPr lang="en-US"/>
           </a:p>
@@ -4067,7 +4067,15 @@
             <a:pPr algn="ctr"/>
             <a:r>
               <a:rPr lang="en-US" sz="1100" dirty="0"/>
-              <a:t>Copyright 2021, 2022, 2023,, Stephen F Elston. All rights reserved</a:t>
+              <a:t>Copyright 2021, 2022, </a:t>
+            </a:r>
+            <a:r>
+              <a:rPr lang="en-US" sz="1100"/>
+              <a:t>2023, 2024, </a:t>
+            </a:r>
+            <a:r>
+              <a:rPr lang="en-US" sz="1100" dirty="0"/>
+              <a:t>Stephen F Elston. All rights reserved</a:t>
             </a:r>
             <a:r>
               <a:rPr lang="en-US" dirty="0"/>
@@ -14073,7 +14081,7 @@
                             <a:rPr lang="en-US" b="0" i="1" smtClean="0">
                               <a:latin typeface="Cambria Math" panose="02040503050406030204" pitchFamily="18" charset="0"/>
                             </a:rPr>
-                            <m:t>1</m:t>
+                            <m:t>0</m:t>
                           </m:r>
                         </m:sub>
                       </m:sSub>
@@ -14762,477 +14770,6 @@
   <p:clrMapOvr>
     <a:masterClrMapping/>
   </p:clrMapOvr>
-  <p:timing>
-    <p:tnLst>
-      <p:par>
-        <p:cTn id="1" dur="indefinite" restart="never" nodeType="tmRoot">
-          <p:childTnLst>
-            <p:seq concurrent="1" nextAc="seek">
-              <p:cTn id="2" dur="indefinite" nodeType="mainSeq">
-                <p:childTnLst>
-                  <p:par>
-                    <p:cTn id="3" fill="hold">
-                      <p:stCondLst>
-                        <p:cond delay="indefinite"/>
-                      </p:stCondLst>
-                      <p:childTnLst>
-                        <p:par>
-                          <p:cTn id="4" fill="hold">
-                            <p:stCondLst>
-                              <p:cond delay="0"/>
-                            </p:stCondLst>
-                            <p:childTnLst>
-                              <p:par>
-                                <p:cTn id="5" presetID="1" presetClass="entr" presetSubtype="0" fill="hold" nodeType="clickEffect">
-                                  <p:stCondLst>
-                                    <p:cond delay="0"/>
-                                  </p:stCondLst>
-                                  <p:childTnLst>
-                                    <p:set>
-                                      <p:cBhvr>
-                                        <p:cTn id="6" dur="1" fill="hold">
-                                          <p:stCondLst>
-                                            <p:cond delay="0"/>
-                                          </p:stCondLst>
-                                        </p:cTn>
-                                        <p:tgtEl>
-                                          <p:spTgt spid="3">
-                                            <p:txEl>
-                                              <p:pRg st="1" end="1"/>
-                                            </p:txEl>
-                                          </p:spTgt>
-                                        </p:tgtEl>
-                                        <p:attrNameLst>
-                                          <p:attrName>style.visibility</p:attrName>
-                                        </p:attrNameLst>
-                                      </p:cBhvr>
-                                      <p:to>
-                                        <p:strVal val="visible"/>
-                                      </p:to>
-                                    </p:set>
-                                  </p:childTnLst>
-                                </p:cTn>
-                              </p:par>
-                            </p:childTnLst>
-                          </p:cTn>
-                        </p:par>
-                      </p:childTnLst>
-                    </p:cTn>
-                  </p:par>
-                  <p:par>
-                    <p:cTn id="7" fill="hold">
-                      <p:stCondLst>
-                        <p:cond delay="indefinite"/>
-                      </p:stCondLst>
-                      <p:childTnLst>
-                        <p:par>
-                          <p:cTn id="8" fill="hold">
-                            <p:stCondLst>
-                              <p:cond delay="0"/>
-                            </p:stCondLst>
-                            <p:childTnLst>
-                              <p:par>
-                                <p:cTn id="9" presetID="1" presetClass="entr" presetSubtype="0" fill="hold" nodeType="clickEffect">
-                                  <p:stCondLst>
-                                    <p:cond delay="0"/>
-                                  </p:stCondLst>
-                                  <p:childTnLst>
-                                    <p:set>
-                                      <p:cBhvr>
-                                        <p:cTn id="10" dur="1" fill="hold">
-                                          <p:stCondLst>
-                                            <p:cond delay="0"/>
-                                          </p:stCondLst>
-                                        </p:cTn>
-                                        <p:tgtEl>
-                                          <p:spTgt spid="3">
-                                            <p:txEl>
-                                              <p:pRg st="2" end="2"/>
-                                            </p:txEl>
-                                          </p:spTgt>
-                                        </p:tgtEl>
-                                        <p:attrNameLst>
-                                          <p:attrName>style.visibility</p:attrName>
-                                        </p:attrNameLst>
-                                      </p:cBhvr>
-                                      <p:to>
-                                        <p:strVal val="visible"/>
-                                      </p:to>
-                                    </p:set>
-                                  </p:childTnLst>
-                                </p:cTn>
-                              </p:par>
-                            </p:childTnLst>
-                          </p:cTn>
-                        </p:par>
-                      </p:childTnLst>
-                    </p:cTn>
-                  </p:par>
-                  <p:par>
-                    <p:cTn id="11" fill="hold">
-                      <p:stCondLst>
-                        <p:cond delay="indefinite"/>
-                      </p:stCondLst>
-                      <p:childTnLst>
-                        <p:par>
-                          <p:cTn id="12" fill="hold">
-                            <p:stCondLst>
-                              <p:cond delay="0"/>
-                            </p:stCondLst>
-                            <p:childTnLst>
-                              <p:par>
-                                <p:cTn id="13" presetID="1" presetClass="entr" presetSubtype="0" fill="hold" nodeType="clickEffect">
-                                  <p:stCondLst>
-                                    <p:cond delay="0"/>
-                                  </p:stCondLst>
-                                  <p:childTnLst>
-                                    <p:set>
-                                      <p:cBhvr>
-                                        <p:cTn id="14" dur="1" fill="hold">
-                                          <p:stCondLst>
-                                            <p:cond delay="0"/>
-                                          </p:stCondLst>
-                                        </p:cTn>
-                                        <p:tgtEl>
-                                          <p:spTgt spid="3">
-                                            <p:txEl>
-                                              <p:pRg st="3" end="3"/>
-                                            </p:txEl>
-                                          </p:spTgt>
-                                        </p:tgtEl>
-                                        <p:attrNameLst>
-                                          <p:attrName>style.visibility</p:attrName>
-                                        </p:attrNameLst>
-                                      </p:cBhvr>
-                                      <p:to>
-                                        <p:strVal val="visible"/>
-                                      </p:to>
-                                    </p:set>
-                                  </p:childTnLst>
-                                </p:cTn>
-                              </p:par>
-                            </p:childTnLst>
-                          </p:cTn>
-                        </p:par>
-                      </p:childTnLst>
-                    </p:cTn>
-                  </p:par>
-                  <p:par>
-                    <p:cTn id="15" fill="hold">
-                      <p:stCondLst>
-                        <p:cond delay="indefinite"/>
-                      </p:stCondLst>
-                      <p:childTnLst>
-                        <p:par>
-                          <p:cTn id="16" fill="hold">
-                            <p:stCondLst>
-                              <p:cond delay="0"/>
-                            </p:stCondLst>
-                            <p:childTnLst>
-                              <p:par>
-                                <p:cTn id="17" presetID="1" presetClass="entr" presetSubtype="0" fill="hold" nodeType="clickEffect">
-                                  <p:stCondLst>
-                                    <p:cond delay="0"/>
-                                  </p:stCondLst>
-                                  <p:childTnLst>
-                                    <p:set>
-                                      <p:cBhvr>
-                                        <p:cTn id="18" dur="1" fill="hold">
-                                          <p:stCondLst>
-                                            <p:cond delay="0"/>
-                                          </p:stCondLst>
-                                        </p:cTn>
-                                        <p:tgtEl>
-                                          <p:spTgt spid="3">
-                                            <p:txEl>
-                                              <p:pRg st="4" end="4"/>
-                                            </p:txEl>
-                                          </p:spTgt>
-                                        </p:tgtEl>
-                                        <p:attrNameLst>
-                                          <p:attrName>style.visibility</p:attrName>
-                                        </p:attrNameLst>
-                                      </p:cBhvr>
-                                      <p:to>
-                                        <p:strVal val="visible"/>
-                                      </p:to>
-                                    </p:set>
-                                  </p:childTnLst>
-                                </p:cTn>
-                              </p:par>
-                            </p:childTnLst>
-                          </p:cTn>
-                        </p:par>
-                      </p:childTnLst>
-                    </p:cTn>
-                  </p:par>
-                  <p:par>
-                    <p:cTn id="19" fill="hold">
-                      <p:stCondLst>
-                        <p:cond delay="indefinite"/>
-                      </p:stCondLst>
-                      <p:childTnLst>
-                        <p:par>
-                          <p:cTn id="20" fill="hold">
-                            <p:stCondLst>
-                              <p:cond delay="0"/>
-                            </p:stCondLst>
-                            <p:childTnLst>
-                              <p:par>
-                                <p:cTn id="21" presetID="1" presetClass="entr" presetSubtype="0" fill="hold" nodeType="clickEffect">
-                                  <p:stCondLst>
-                                    <p:cond delay="0"/>
-                                  </p:stCondLst>
-                                  <p:childTnLst>
-                                    <p:set>
-                                      <p:cBhvr>
-                                        <p:cTn id="22" dur="1" fill="hold">
-                                          <p:stCondLst>
-                                            <p:cond delay="0"/>
-                                          </p:stCondLst>
-                                        </p:cTn>
-                                        <p:tgtEl>
-                                          <p:spTgt spid="3">
-                                            <p:txEl>
-                                              <p:pRg st="5" end="5"/>
-                                            </p:txEl>
-                                          </p:spTgt>
-                                        </p:tgtEl>
-                                        <p:attrNameLst>
-                                          <p:attrName>style.visibility</p:attrName>
-                                        </p:attrNameLst>
-                                      </p:cBhvr>
-                                      <p:to>
-                                        <p:strVal val="visible"/>
-                                      </p:to>
-                                    </p:set>
-                                  </p:childTnLst>
-                                </p:cTn>
-                              </p:par>
-                            </p:childTnLst>
-                          </p:cTn>
-                        </p:par>
-                      </p:childTnLst>
-                    </p:cTn>
-                  </p:par>
-                  <p:par>
-                    <p:cTn id="23" fill="hold">
-                      <p:stCondLst>
-                        <p:cond delay="indefinite"/>
-                      </p:stCondLst>
-                      <p:childTnLst>
-                        <p:par>
-                          <p:cTn id="24" fill="hold">
-                            <p:stCondLst>
-                              <p:cond delay="0"/>
-                            </p:stCondLst>
-                            <p:childTnLst>
-                              <p:par>
-                                <p:cTn id="25" presetID="1" presetClass="entr" presetSubtype="0" fill="hold" nodeType="clickEffect">
-                                  <p:stCondLst>
-                                    <p:cond delay="0"/>
-                                  </p:stCondLst>
-                                  <p:childTnLst>
-                                    <p:set>
-                                      <p:cBhvr>
-                                        <p:cTn id="26" dur="1" fill="hold">
-                                          <p:stCondLst>
-                                            <p:cond delay="0"/>
-                                          </p:stCondLst>
-                                        </p:cTn>
-                                        <p:tgtEl>
-                                          <p:spTgt spid="3">
-                                            <p:txEl>
-                                              <p:pRg st="6" end="6"/>
-                                            </p:txEl>
-                                          </p:spTgt>
-                                        </p:tgtEl>
-                                        <p:attrNameLst>
-                                          <p:attrName>style.visibility</p:attrName>
-                                        </p:attrNameLst>
-                                      </p:cBhvr>
-                                      <p:to>
-                                        <p:strVal val="visible"/>
-                                      </p:to>
-                                    </p:set>
-                                  </p:childTnLst>
-                                </p:cTn>
-                              </p:par>
-                            </p:childTnLst>
-                          </p:cTn>
-                        </p:par>
-                      </p:childTnLst>
-                    </p:cTn>
-                  </p:par>
-                  <p:par>
-                    <p:cTn id="27" fill="hold">
-                      <p:stCondLst>
-                        <p:cond delay="indefinite"/>
-                      </p:stCondLst>
-                      <p:childTnLst>
-                        <p:par>
-                          <p:cTn id="28" fill="hold">
-                            <p:stCondLst>
-                              <p:cond delay="0"/>
-                            </p:stCondLst>
-                            <p:childTnLst>
-                              <p:par>
-                                <p:cTn id="29" presetID="1" presetClass="entr" presetSubtype="0" fill="hold" nodeType="clickEffect">
-                                  <p:stCondLst>
-                                    <p:cond delay="0"/>
-                                  </p:stCondLst>
-                                  <p:childTnLst>
-                                    <p:set>
-                                      <p:cBhvr>
-                                        <p:cTn id="30" dur="1" fill="hold">
-                                          <p:stCondLst>
-                                            <p:cond delay="0"/>
-                                          </p:stCondLst>
-                                        </p:cTn>
-                                        <p:tgtEl>
-                                          <p:spTgt spid="3">
-                                            <p:txEl>
-                                              <p:pRg st="7" end="7"/>
-                                            </p:txEl>
-                                          </p:spTgt>
-                                        </p:tgtEl>
-                                        <p:attrNameLst>
-                                          <p:attrName>style.visibility</p:attrName>
-                                        </p:attrNameLst>
-                                      </p:cBhvr>
-                                      <p:to>
-                                        <p:strVal val="visible"/>
-                                      </p:to>
-                                    </p:set>
-                                  </p:childTnLst>
-                                </p:cTn>
-                              </p:par>
-                            </p:childTnLst>
-                          </p:cTn>
-                        </p:par>
-                      </p:childTnLst>
-                    </p:cTn>
-                  </p:par>
-                  <p:par>
-                    <p:cTn id="31" fill="hold">
-                      <p:stCondLst>
-                        <p:cond delay="indefinite"/>
-                      </p:stCondLst>
-                      <p:childTnLst>
-                        <p:par>
-                          <p:cTn id="32" fill="hold">
-                            <p:stCondLst>
-                              <p:cond delay="0"/>
-                            </p:stCondLst>
-                            <p:childTnLst>
-                              <p:par>
-                                <p:cTn id="33" presetID="1" presetClass="entr" presetSubtype="0" fill="hold" nodeType="clickEffect">
-                                  <p:stCondLst>
-                                    <p:cond delay="0"/>
-                                  </p:stCondLst>
-                                  <p:childTnLst>
-                                    <p:set>
-                                      <p:cBhvr>
-                                        <p:cTn id="34" dur="1" fill="hold">
-                                          <p:stCondLst>
-                                            <p:cond delay="0"/>
-                                          </p:stCondLst>
-                                        </p:cTn>
-                                        <p:tgtEl>
-                                          <p:spTgt spid="3">
-                                            <p:txEl>
-                                              <p:pRg st="8" end="8"/>
-                                            </p:txEl>
-                                          </p:spTgt>
-                                        </p:tgtEl>
-                                        <p:attrNameLst>
-                                          <p:attrName>style.visibility</p:attrName>
-                                        </p:attrNameLst>
-                                      </p:cBhvr>
-                                      <p:to>
-                                        <p:strVal val="visible"/>
-                                      </p:to>
-                                    </p:set>
-                                  </p:childTnLst>
-                                </p:cTn>
-                              </p:par>
-                            </p:childTnLst>
-                          </p:cTn>
-                        </p:par>
-                      </p:childTnLst>
-                    </p:cTn>
-                  </p:par>
-                  <p:par>
-                    <p:cTn id="35" fill="hold">
-                      <p:stCondLst>
-                        <p:cond delay="indefinite"/>
-                      </p:stCondLst>
-                      <p:childTnLst>
-                        <p:par>
-                          <p:cTn id="36" fill="hold">
-                            <p:stCondLst>
-                              <p:cond delay="0"/>
-                            </p:stCondLst>
-                            <p:childTnLst>
-                              <p:par>
-                                <p:cTn id="37" presetID="1" presetClass="entr" presetSubtype="0" fill="hold" nodeType="clickEffect">
-                                  <p:stCondLst>
-                                    <p:cond delay="0"/>
-                                  </p:stCondLst>
-                                  <p:childTnLst>
-                                    <p:set>
-                                      <p:cBhvr>
-                                        <p:cTn id="38" dur="1" fill="hold">
-                                          <p:stCondLst>
-                                            <p:cond delay="0"/>
-                                          </p:stCondLst>
-                                        </p:cTn>
-                                        <p:tgtEl>
-                                          <p:spTgt spid="3">
-                                            <p:txEl>
-                                              <p:pRg st="9" end="9"/>
-                                            </p:txEl>
-                                          </p:spTgt>
-                                        </p:tgtEl>
-                                        <p:attrNameLst>
-                                          <p:attrName>style.visibility</p:attrName>
-                                        </p:attrNameLst>
-                                      </p:cBhvr>
-                                      <p:to>
-                                        <p:strVal val="visible"/>
-                                      </p:to>
-                                    </p:set>
-                                  </p:childTnLst>
-                                </p:cTn>
-                              </p:par>
-                            </p:childTnLst>
-                          </p:cTn>
-                        </p:par>
-                      </p:childTnLst>
-                    </p:cTn>
-                  </p:par>
-                </p:childTnLst>
-              </p:cTn>
-              <p:prevCondLst>
-                <p:cond evt="onPrev" delay="0">
-                  <p:tgtEl>
-                    <p:sldTgt/>
-                  </p:tgtEl>
-                </p:cond>
-              </p:prevCondLst>
-              <p:nextCondLst>
-                <p:cond evt="onNext" delay="0">
-                  <p:tgtEl>
-                    <p:sldTgt/>
-                  </p:tgtEl>
-                </p:cond>
-              </p:nextCondLst>
-            </p:seq>
-          </p:childTnLst>
-        </p:cTn>
-      </p:par>
-    </p:tnLst>
-  </p:timing>
 </p:sld>
 </file>
 
@@ -15309,7 +14846,22 @@
             <a:pPr lvl="1"/>
             <a:r>
               <a:rPr lang="en-US" dirty="0"/>
-              <a:t>Vehicles passing </a:t>
+              <a:t>Clicks on </a:t>
+            </a:r>
+            <a:r>
+              <a:rPr lang="en-US"/>
+              <a:t>web sites </a:t>
+            </a:r>
+          </a:p>
+          <a:p>
+            <a:pPr lvl="1"/>
+            <a:r>
+              <a:rPr lang="en-US"/>
+              <a:t>Vehicles </a:t>
+            </a:r>
+            <a:r>
+              <a:rPr lang="en-US" dirty="0"/>
+              <a:t>passing </a:t>
             </a:r>
           </a:p>
           <a:p>
@@ -15716,33 +15268,15 @@
                                   </p:childTnLst>
                                 </p:cTn>
                               </p:par>
-                            </p:childTnLst>
-                          </p:cTn>
-                        </p:par>
-                      </p:childTnLst>
-                    </p:cTn>
-                  </p:par>
-                  <p:par>
-                    <p:cTn id="23" fill="hold">
-                      <p:stCondLst>
-                        <p:cond delay="indefinite"/>
-                      </p:stCondLst>
-                      <p:childTnLst>
-                        <p:par>
-                          <p:cTn id="24" fill="hold">
-                            <p:stCondLst>
-                              <p:cond delay="0"/>
-                            </p:stCondLst>
-                            <p:childTnLst>
                               <p:par>
-                                <p:cTn id="25" presetID="1" presetClass="entr" presetSubtype="0" fill="hold" nodeType="clickEffect">
+                                <p:cTn id="23" presetID="1" presetClass="entr" presetSubtype="0" fill="hold" nodeType="withEffect">
                                   <p:stCondLst>
                                     <p:cond delay="0"/>
                                   </p:stCondLst>
                                   <p:childTnLst>
                                     <p:set>
                                       <p:cBhvr>
-                                        <p:cTn id="26" dur="1" fill="hold">
+                                        <p:cTn id="24" dur="1" fill="hold">
                                           <p:stCondLst>
                                             <p:cond delay="0"/>
                                           </p:stCondLst>
@@ -15751,6 +15285,55 @@
                                           <p:spTgt spid="3">
                                             <p:txEl>
                                               <p:pRg st="9" end="9"/>
+                                            </p:txEl>
+                                          </p:spTgt>
+                                        </p:tgtEl>
+                                        <p:attrNameLst>
+                                          <p:attrName>style.visibility</p:attrName>
+                                        </p:attrNameLst>
+                                      </p:cBhvr>
+                                      <p:to>
+                                        <p:strVal val="visible"/>
+                                      </p:to>
+                                    </p:set>
+                                  </p:childTnLst>
+                                </p:cTn>
+                              </p:par>
+                            </p:childTnLst>
+                          </p:cTn>
+                        </p:par>
+                      </p:childTnLst>
+                    </p:cTn>
+                  </p:par>
+                  <p:par>
+                    <p:cTn id="25" fill="hold">
+                      <p:stCondLst>
+                        <p:cond delay="indefinite"/>
+                      </p:stCondLst>
+                      <p:childTnLst>
+                        <p:par>
+                          <p:cTn id="26" fill="hold">
+                            <p:stCondLst>
+                              <p:cond delay="0"/>
+                            </p:stCondLst>
+                            <p:childTnLst>
+                              <p:par>
+                                <p:cTn id="27" presetID="1" presetClass="entr" presetSubtype="0" fill="hold" nodeType="clickEffect">
+                                  <p:stCondLst>
+                                    <p:cond delay="0"/>
+                                  </p:stCondLst>
+                                  <p:childTnLst>
+                                    <p:set>
+                                      <p:cBhvr>
+                                        <p:cTn id="28" dur="1" fill="hold">
+                                          <p:stCondLst>
+                                            <p:cond delay="0"/>
+                                          </p:stCondLst>
+                                        </p:cTn>
+                                        <p:tgtEl>
+                                          <p:spTgt spid="3">
+                                            <p:txEl>
+                                              <p:pRg st="10" end="10"/>
                                             </p:txEl>
                                           </p:spTgt>
                                         </p:tgtEl>
@@ -30309,8 +29892,8 @@
           <a:chExt cx="0" cy="0"/>
         </a:xfrm>
       </p:grpSpPr>
-      <mc:AlternateContent xmlns:mc="http://schemas.openxmlformats.org/markup-compatibility/2006" xmlns:a14="http://schemas.microsoft.com/office/drawing/2010/main">
-        <mc:Choice Requires="a14">
+      <mc:AlternateContent xmlns:mc="http://schemas.openxmlformats.org/markup-compatibility/2006">
+        <mc:Choice xmlns:a14="http://schemas.microsoft.com/office/drawing/2010/main" Requires="a14">
           <p:sp>
             <p:nvSpPr>
               <p:cNvPr id="3" name="Content Placeholder 2">
@@ -30382,10 +29965,10 @@
                       </m:e>
                       <m:sub>
                         <m:r>
-                          <a:rPr lang="en-US" sz="3200" i="1">
+                          <a:rPr lang="en-US" sz="3200" b="0" i="1" smtClean="0">
                             <a:latin typeface="Cambria Math" panose="02040503050406030204" pitchFamily="18" charset="0"/>
                           </a:rPr>
-                          <m:t>1</m:t>
+                          <m:t>𝑖</m:t>
                         </m:r>
                       </m:sub>
                     </m:sSub>
@@ -30430,10 +30013,10 @@
                       </m:e>
                       <m:sub>
                         <m:r>
-                          <a:rPr lang="en-US" sz="3200" i="1">
+                          <a:rPr lang="en-US" sz="3200" b="0" i="1" smtClean="0">
                             <a:latin typeface="Cambria Math" panose="02040503050406030204" pitchFamily="18" charset="0"/>
                           </a:rPr>
-                          <m:t>1</m:t>
+                          <m:t>𝑖</m:t>
                         </m:r>
                       </m:sub>
                     </m:sSub>
@@ -30528,7 +30111,7 @@
             </p:txBody>
           </p:sp>
         </mc:Choice>
-        <mc:Fallback xmlns="">
+        <mc:Fallback>
           <p:sp>
             <p:nvSpPr>
               <p:cNvPr id="3" name="Content Placeholder 2">
@@ -32665,6 +32248,9 @@
                     <p:cTn id="3" fill="hold">
                       <p:stCondLst>
                         <p:cond delay="indefinite"/>
+                        <p:cond evt="onBegin" delay="0">
+                          <p:tn val="2"/>
+                        </p:cond>
                       </p:stCondLst>
                       <p:childTnLst>
                         <p:par>
@@ -32674,7 +32260,7 @@
                             </p:stCondLst>
                             <p:childTnLst>
                               <p:par>
-                                <p:cTn id="5" presetID="1" presetClass="entr" presetSubtype="0" fill="hold" nodeType="clickEffect">
+                                <p:cTn id="5" presetID="1" presetClass="entr" presetSubtype="0" fill="hold" grpId="0" nodeType="withEffect">
                                   <p:stCondLst>
                                     <p:cond delay="0"/>
                                   </p:stCondLst>
@@ -32687,11 +32273,7 @@
                                           </p:stCondLst>
                                         </p:cTn>
                                         <p:tgtEl>
-                                          <p:spTgt spid="3">
-                                            <p:txEl>
-                                              <p:pRg st="1" end="1"/>
-                                            </p:txEl>
-                                          </p:spTgt>
+                                          <p:spTgt spid="10"/>
                                         </p:tgtEl>
                                         <p:attrNameLst>
                                           <p:attrName>style.visibility</p:attrName>
@@ -32718,7 +32300,7 @@
                                           </p:stCondLst>
                                         </p:cTn>
                                         <p:tgtEl>
-                                          <p:spTgt spid="10"/>
+                                          <p:spTgt spid="16"/>
                                         </p:tgtEl>
                                         <p:attrNameLst>
                                           <p:attrName>style.visibility</p:attrName>
@@ -32745,7 +32327,7 @@
                                           </p:stCondLst>
                                         </p:cTn>
                                         <p:tgtEl>
-                                          <p:spTgt spid="16"/>
+                                          <p:spTgt spid="19"/>
                                         </p:tgtEl>
                                         <p:attrNameLst>
                                           <p:attrName>style.visibility</p:attrName>
@@ -32772,7 +32354,7 @@
                                           </p:stCondLst>
                                         </p:cTn>
                                         <p:tgtEl>
-                                          <p:spTgt spid="19"/>
+                                          <p:spTgt spid="20"/>
                                         </p:tgtEl>
                                         <p:attrNameLst>
                                           <p:attrName>style.visibility</p:attrName>
@@ -32799,7 +32381,7 @@
                                           </p:stCondLst>
                                         </p:cTn>
                                         <p:tgtEl>
-                                          <p:spTgt spid="20"/>
+                                          <p:spTgt spid="26"/>
                                         </p:tgtEl>
                                         <p:attrNameLst>
                                           <p:attrName>style.visibility</p:attrName>
@@ -32826,7 +32408,7 @@
                                           </p:stCondLst>
                                         </p:cTn>
                                         <p:tgtEl>
-                                          <p:spTgt spid="26"/>
+                                          <p:spTgt spid="27"/>
                                         </p:tgtEl>
                                         <p:attrNameLst>
                                           <p:attrName>style.visibility</p:attrName>
@@ -32853,7 +32435,7 @@
                                           </p:stCondLst>
                                         </p:cTn>
                                         <p:tgtEl>
-                                          <p:spTgt spid="27"/>
+                                          <p:spTgt spid="28"/>
                                         </p:tgtEl>
                                         <p:attrNameLst>
                                           <p:attrName>style.visibility</p:attrName>
@@ -32880,7 +32462,7 @@
                                           </p:stCondLst>
                                         </p:cTn>
                                         <p:tgtEl>
-                                          <p:spTgt spid="28"/>
+                                          <p:spTgt spid="30"/>
                                         </p:tgtEl>
                                         <p:attrNameLst>
                                           <p:attrName>style.visibility</p:attrName>
@@ -32907,7 +32489,7 @@
                                           </p:stCondLst>
                                         </p:cTn>
                                         <p:tgtEl>
-                                          <p:spTgt spid="30"/>
+                                          <p:spTgt spid="31"/>
                                         </p:tgtEl>
                                         <p:attrNameLst>
                                           <p:attrName>style.visibility</p:attrName>
@@ -32920,26 +32502,35 @@
                                   </p:childTnLst>
                                 </p:cTn>
                               </p:par>
-                            </p:childTnLst>
-                          </p:cTn>
-                        </p:par>
-                      </p:childTnLst>
-                    </p:cTn>
-                  </p:par>
-                  <p:par>
-                    <p:cTn id="23" fill="hold">
-                      <p:stCondLst>
-                        <p:cond delay="indefinite"/>
-                      </p:stCondLst>
-                      <p:childTnLst>
-                        <p:par>
-                          <p:cTn id="24" fill="hold">
-                            <p:stCondLst>
-                              <p:cond delay="0"/>
-                            </p:stCondLst>
-                            <p:childTnLst>
                               <p:par>
-                                <p:cTn id="25" presetID="1" presetClass="entr" presetSubtype="0" fill="hold" nodeType="clickEffect">
+                                <p:cTn id="23" presetID="1" presetClass="entr" presetSubtype="0" fill="hold" grpId="0" nodeType="withEffect">
+                                  <p:stCondLst>
+                                    <p:cond delay="0"/>
+                                  </p:stCondLst>
+                                  <p:childTnLst>
+                                    <p:set>
+                                      <p:cBhvr>
+                                        <p:cTn id="24" dur="1" fill="hold">
+                                          <p:stCondLst>
+                                            <p:cond delay="0"/>
+                                          </p:stCondLst>
+                                        </p:cTn>
+                                        <p:tgtEl>
+                                          <p:spTgt spid="32"/>
+                                        </p:tgtEl>
+                                        <p:attrNameLst>
+                                          <p:attrName>style.visibility</p:attrName>
+                                        </p:attrNameLst>
+                                      </p:cBhvr>
+                                      <p:to>
+                                        <p:strVal val="visible"/>
+                                      </p:to>
+                                    </p:set>
+                                  </p:childTnLst>
+                                </p:cTn>
+                              </p:par>
+                              <p:par>
+                                <p:cTn id="25" presetID="1" presetClass="entr" presetSubtype="0" fill="hold" grpId="0" nodeType="withEffect">
                                   <p:stCondLst>
                                     <p:cond delay="0"/>
                                   </p:stCondLst>
@@ -32952,11 +32543,7 @@
                                           </p:stCondLst>
                                         </p:cTn>
                                         <p:tgtEl>
-                                          <p:spTgt spid="3">
-                                            <p:txEl>
-                                              <p:pRg st="2" end="2"/>
-                                            </p:txEl>
-                                          </p:spTgt>
+                                          <p:spTgt spid="33"/>
                                         </p:tgtEl>
                                         <p:attrNameLst>
                                           <p:attrName>style.visibility</p:attrName>
@@ -32983,7 +32570,7 @@
                                           </p:stCondLst>
                                         </p:cTn>
                                         <p:tgtEl>
-                                          <p:spTgt spid="31"/>
+                                          <p:spTgt spid="34"/>
                                         </p:tgtEl>
                                         <p:attrNameLst>
                                           <p:attrName>style.visibility</p:attrName>
@@ -33010,7 +32597,7 @@
                                           </p:stCondLst>
                                         </p:cTn>
                                         <p:tgtEl>
-                                          <p:spTgt spid="32"/>
+                                          <p:spTgt spid="35"/>
                                         </p:tgtEl>
                                         <p:attrNameLst>
                                           <p:attrName>style.visibility</p:attrName>
@@ -33037,7 +32624,7 @@
                                           </p:stCondLst>
                                         </p:cTn>
                                         <p:tgtEl>
-                                          <p:spTgt spid="33"/>
+                                          <p:spTgt spid="36"/>
                                         </p:tgtEl>
                                         <p:attrNameLst>
                                           <p:attrName>style.visibility</p:attrName>
@@ -33064,7 +32651,7 @@
                                           </p:stCondLst>
                                         </p:cTn>
                                         <p:tgtEl>
-                                          <p:spTgt spid="34"/>
+                                          <p:spTgt spid="37"/>
                                         </p:tgtEl>
                                         <p:attrNameLst>
                                           <p:attrName>style.visibility</p:attrName>
@@ -33091,186 +32678,7 @@
                                           </p:stCondLst>
                                         </p:cTn>
                                         <p:tgtEl>
-                                          <p:spTgt spid="35"/>
-                                        </p:tgtEl>
-                                        <p:attrNameLst>
-                                          <p:attrName>style.visibility</p:attrName>
-                                        </p:attrNameLst>
-                                      </p:cBhvr>
-                                      <p:to>
-                                        <p:strVal val="visible"/>
-                                      </p:to>
-                                    </p:set>
-                                  </p:childTnLst>
-                                </p:cTn>
-                              </p:par>
-                              <p:par>
-                                <p:cTn id="37" presetID="1" presetClass="entr" presetSubtype="0" fill="hold" grpId="0" nodeType="withEffect">
-                                  <p:stCondLst>
-                                    <p:cond delay="0"/>
-                                  </p:stCondLst>
-                                  <p:childTnLst>
-                                    <p:set>
-                                      <p:cBhvr>
-                                        <p:cTn id="38" dur="1" fill="hold">
-                                          <p:stCondLst>
-                                            <p:cond delay="0"/>
-                                          </p:stCondLst>
-                                        </p:cTn>
-                                        <p:tgtEl>
-                                          <p:spTgt spid="36"/>
-                                        </p:tgtEl>
-                                        <p:attrNameLst>
-                                          <p:attrName>style.visibility</p:attrName>
-                                        </p:attrNameLst>
-                                      </p:cBhvr>
-                                      <p:to>
-                                        <p:strVal val="visible"/>
-                                      </p:to>
-                                    </p:set>
-                                  </p:childTnLst>
-                                </p:cTn>
-                              </p:par>
-                              <p:par>
-                                <p:cTn id="39" presetID="1" presetClass="entr" presetSubtype="0" fill="hold" grpId="0" nodeType="withEffect">
-                                  <p:stCondLst>
-                                    <p:cond delay="0"/>
-                                  </p:stCondLst>
-                                  <p:childTnLst>
-                                    <p:set>
-                                      <p:cBhvr>
-                                        <p:cTn id="40" dur="1" fill="hold">
-                                          <p:stCondLst>
-                                            <p:cond delay="0"/>
-                                          </p:stCondLst>
-                                        </p:cTn>
-                                        <p:tgtEl>
-                                          <p:spTgt spid="37"/>
-                                        </p:tgtEl>
-                                        <p:attrNameLst>
-                                          <p:attrName>style.visibility</p:attrName>
-                                        </p:attrNameLst>
-                                      </p:cBhvr>
-                                      <p:to>
-                                        <p:strVal val="visible"/>
-                                      </p:to>
-                                    </p:set>
-                                  </p:childTnLst>
-                                </p:cTn>
-                              </p:par>
-                              <p:par>
-                                <p:cTn id="41" presetID="1" presetClass="entr" presetSubtype="0" fill="hold" grpId="0" nodeType="withEffect">
-                                  <p:stCondLst>
-                                    <p:cond delay="0"/>
-                                  </p:stCondLst>
-                                  <p:childTnLst>
-                                    <p:set>
-                                      <p:cBhvr>
-                                        <p:cTn id="42" dur="1" fill="hold">
-                                          <p:stCondLst>
-                                            <p:cond delay="0"/>
-                                          </p:stCondLst>
-                                        </p:cTn>
-                                        <p:tgtEl>
                                           <p:spTgt spid="38"/>
-                                        </p:tgtEl>
-                                        <p:attrNameLst>
-                                          <p:attrName>style.visibility</p:attrName>
-                                        </p:attrNameLst>
-                                      </p:cBhvr>
-                                      <p:to>
-                                        <p:strVal val="visible"/>
-                                      </p:to>
-                                    </p:set>
-                                  </p:childTnLst>
-                                </p:cTn>
-                              </p:par>
-                            </p:childTnLst>
-                          </p:cTn>
-                        </p:par>
-                      </p:childTnLst>
-                    </p:cTn>
-                  </p:par>
-                  <p:par>
-                    <p:cTn id="43" fill="hold">
-                      <p:stCondLst>
-                        <p:cond delay="indefinite"/>
-                      </p:stCondLst>
-                      <p:childTnLst>
-                        <p:par>
-                          <p:cTn id="44" fill="hold">
-                            <p:stCondLst>
-                              <p:cond delay="0"/>
-                            </p:stCondLst>
-                            <p:childTnLst>
-                              <p:par>
-                                <p:cTn id="45" presetID="1" presetClass="entr" presetSubtype="0" fill="hold" nodeType="clickEffect">
-                                  <p:stCondLst>
-                                    <p:cond delay="0"/>
-                                  </p:stCondLst>
-                                  <p:childTnLst>
-                                    <p:set>
-                                      <p:cBhvr>
-                                        <p:cTn id="46" dur="1" fill="hold">
-                                          <p:stCondLst>
-                                            <p:cond delay="0"/>
-                                          </p:stCondLst>
-                                        </p:cTn>
-                                        <p:tgtEl>
-                                          <p:spTgt spid="3">
-                                            <p:txEl>
-                                              <p:pRg st="3" end="3"/>
-                                            </p:txEl>
-                                          </p:spTgt>
-                                        </p:tgtEl>
-                                        <p:attrNameLst>
-                                          <p:attrName>style.visibility</p:attrName>
-                                        </p:attrNameLst>
-                                      </p:cBhvr>
-                                      <p:to>
-                                        <p:strVal val="visible"/>
-                                      </p:to>
-                                    </p:set>
-                                  </p:childTnLst>
-                                </p:cTn>
-                              </p:par>
-                            </p:childTnLst>
-                          </p:cTn>
-                        </p:par>
-                      </p:childTnLst>
-                    </p:cTn>
-                  </p:par>
-                  <p:par>
-                    <p:cTn id="47" fill="hold">
-                      <p:stCondLst>
-                        <p:cond delay="indefinite"/>
-                      </p:stCondLst>
-                      <p:childTnLst>
-                        <p:par>
-                          <p:cTn id="48" fill="hold">
-                            <p:stCondLst>
-                              <p:cond delay="0"/>
-                            </p:stCondLst>
-                            <p:childTnLst>
-                              <p:par>
-                                <p:cTn id="49" presetID="1" presetClass="entr" presetSubtype="0" fill="hold" nodeType="clickEffect">
-                                  <p:stCondLst>
-                                    <p:cond delay="0"/>
-                                  </p:stCondLst>
-                                  <p:childTnLst>
-                                    <p:set>
-                                      <p:cBhvr>
-                                        <p:cTn id="50" dur="1" fill="hold">
-                                          <p:stCondLst>
-                                            <p:cond delay="0"/>
-                                          </p:stCondLst>
-                                        </p:cTn>
-                                        <p:tgtEl>
-                                          <p:spTgt spid="3">
-                                            <p:txEl>
-                                              <p:pRg st="4" end="4"/>
-                                            </p:txEl>
-                                          </p:spTgt>
                                         </p:tgtEl>
                                         <p:attrNameLst>
                                           <p:attrName>style.visibility</p:attrName>
@@ -36802,8 +36210,8 @@
           <a:chExt cx="0" cy="0"/>
         </a:xfrm>
       </p:grpSpPr>
-      <mc:AlternateContent xmlns:mc="http://schemas.openxmlformats.org/markup-compatibility/2006">
-        <mc:Choice xmlns:a14="http://schemas.microsoft.com/office/drawing/2010/main" Requires="a14">
+      <mc:AlternateContent xmlns:mc="http://schemas.openxmlformats.org/markup-compatibility/2006" xmlns:a14="http://schemas.microsoft.com/office/drawing/2010/main">
+        <mc:Choice Requires="a14">
           <p:sp>
             <p:nvSpPr>
               <p:cNvPr id="3" name="Content Placeholder 2">
@@ -37049,13 +36457,7 @@
                         <a:rPr lang="en-US" b="0" i="1" smtClean="0">
                           <a:latin typeface="Cambria Math" panose="02040503050406030204" pitchFamily="18" charset="0"/>
                         </a:rPr>
-                        <m:t>)</m:t>
-                      </m:r>
-                      <m:r>
-                        <a:rPr lang="en-US" b="0" i="1" smtClean="0">
-                          <a:latin typeface="Cambria Math" panose="02040503050406030204" pitchFamily="18" charset="0"/>
-                        </a:rPr>
-                        <m:t>=</m:t>
+                        <m:t>)=</m:t>
                       </m:r>
                       <m:nary>
                         <m:naryPr>
@@ -37560,7 +36962,7 @@
             </p:txBody>
           </p:sp>
         </mc:Choice>
-        <mc:Fallback>
+        <mc:Fallback xmlns="">
           <p:sp>
             <p:nvSpPr>
               <p:cNvPr id="3" name="Content Placeholder 2">
@@ -43934,7 +43336,7 @@
           <a:p>
             <a:r>
               <a:rPr lang="en-US" dirty="0"/>
-              <a:t>Can we filter massive streams?  </a:t>
+              <a:t>We can filter massive streams  </a:t>
             </a:r>
           </a:p>
           <a:p>

</xml_diff>

<commit_message>
Corrected typo in Exercise 1-8 instructions
</commit_message>
<xml_diff>
--- a/slides/3_StreamingAnalytics.pptx
+++ b/slides/3_StreamingAnalytics.pptx
@@ -36210,8 +36210,8 @@
           <a:chExt cx="0" cy="0"/>
         </a:xfrm>
       </p:grpSpPr>
-      <mc:AlternateContent xmlns:mc="http://schemas.openxmlformats.org/markup-compatibility/2006" xmlns:a14="http://schemas.microsoft.com/office/drawing/2010/main">
-        <mc:Choice Requires="a14">
+      <mc:AlternateContent xmlns:mc="http://schemas.openxmlformats.org/markup-compatibility/2006">
+        <mc:Choice xmlns:a14="http://schemas.microsoft.com/office/drawing/2010/main" Requires="a14">
           <p:sp>
             <p:nvSpPr>
               <p:cNvPr id="3" name="Content Placeholder 2">
@@ -36405,7 +36405,7 @@
                 </a14:m>
                 <a:r>
                   <a:rPr lang="en-US" dirty="0"/>
-                  <a:t>, and binary string of length </a:t>
+                  <a:t>, a binary string of length </a:t>
                 </a:r>
                 <a14:m>
                   <m:oMath xmlns:m="http://schemas.openxmlformats.org/officeDocument/2006/math">
@@ -36962,7 +36962,7 @@
             </p:txBody>
           </p:sp>
         </mc:Choice>
-        <mc:Fallback xmlns="">
+        <mc:Fallback>
           <p:sp>
             <p:nvSpPr>
               <p:cNvPr id="3" name="Content Placeholder 2">

</xml_diff>